<commit_message>
Vortrag QConf Step 3
</commit_message>
<xml_diff>
--- a/doc/2020-09_TriXX_Otto_QConf.pptx
+++ b/doc/2020-09_TriXX_Otto_QConf.pptx
@@ -402,7 +402,7 @@
           <a:p>
             <a:fld id="{65198459-C4F2-C045-9966-EFD31D2DED12}" type="datetime1">
               <a:rPr lang="de-DE" smtClean="0"/>
-              <a:t>01.09.20</a:t>
+              <a:t>02.09.20</a:t>
             </a:fld>
             <a:endParaRPr lang="de-DE"/>
           </a:p>
@@ -568,7 +568,7 @@
           <a:p>
             <a:fld id="{DFE97338-3F22-2E45-8586-98FF6A44F26F}" type="datetime1">
               <a:rPr lang="de-DE" smtClean="0"/>
-              <a:t>01.09.20</a:t>
+              <a:t>02.09.20</a:t>
             </a:fld>
             <a:endParaRPr lang="de-DE"/>
           </a:p>
@@ -18481,6 +18481,58 @@
           </a:p>
         </p:txBody>
       </p:sp>
+      <p:sp>
+        <p:nvSpPr>
+          <p:cNvPr id="6" name="Textfeld 5">
+            <a:extLst>
+              <a:ext uri="{FF2B5EF4-FFF2-40B4-BE49-F238E27FC236}">
+                <a16:creationId xmlns:a16="http://schemas.microsoft.com/office/drawing/2014/main" id="{D251F692-1371-1548-BA3A-DB8C18A74215}"/>
+              </a:ext>
+            </a:extLst>
+          </p:cNvPr>
+          <p:cNvSpPr txBox="1"/>
+          <p:nvPr/>
+        </p:nvSpPr>
+        <p:spPr>
+          <a:xfrm>
+            <a:off x="1140903" y="3821628"/>
+            <a:ext cx="7113864" cy="914400"/>
+          </a:xfrm>
+          <a:prstGeom prst="rect">
+            <a:avLst/>
+          </a:prstGeom>
+        </p:spPr>
+        <p:txBody>
+          <a:bodyPr vert="horz" wrap="none" lIns="0" tIns="0" rIns="0" bIns="0" rtlCol="0">
+            <a:noAutofit/>
+          </a:bodyPr>
+          <a:lstStyle/>
+          <a:p>
+            <a:r>
+              <a:rPr lang="de-DE" dirty="0"/>
+              <a:t>Fahrplan mit einzelnen </a:t>
+            </a:r>
+            <a:r>
+              <a:rPr lang="de-DE" dirty="0" err="1"/>
+              <a:t>Steps</a:t>
+            </a:r>
+            <a:r>
+              <a:rPr lang="de-DE" dirty="0"/>
+              <a:t> der Demo:	</a:t>
+            </a:r>
+            <a:r>
+              <a:rPr lang="de-DE" dirty="0">
+                <a:hlinkClick r:id="rId2"/>
+              </a:rPr>
+              <a:t>https://bit.ly/31Qq87v</a:t>
+            </a:r>
+            <a:endParaRPr lang="de-DE" dirty="0"/>
+          </a:p>
+          <a:p>
+            <a:endParaRPr lang="de-DE" dirty="0"/>
+          </a:p>
+        </p:txBody>
+      </p:sp>
     </p:spTree>
     <p:extLst>
       <p:ext uri="{BB962C8B-B14F-4D97-AF65-F5344CB8AC3E}">
@@ -18523,7 +18575,7 @@
         </p:nvSpPr>
         <p:spPr>
           <a:xfrm>
-            <a:off x="383118" y="1218143"/>
+            <a:off x="307618" y="849027"/>
             <a:ext cx="8370590" cy="789575"/>
           </a:xfrm>
         </p:spPr>
@@ -18531,6 +18583,7 @@
           <a:bodyPr/>
           <a:lstStyle/>
           <a:p>
+            <a:pPr algn="ctr"/>
             <a:r>
               <a:rPr lang="de-DE" dirty="0"/>
               <a:t>Vielen Dank für Euer Interesse</a:t>
@@ -18546,61 +18599,40 @@
             </a:br>
             <a:r>
               <a:rPr lang="de-DE" sz="2400" dirty="0"/>
-              <a:t>Vortrag zum Download </a:t>
+              <a:t>Vortrag zum Download 	</a:t>
             </a:r>
             <a:r>
               <a:rPr lang="de-DE" sz="2400" dirty="0">
                 <a:hlinkClick r:id="rId3"/>
               </a:rPr>
-              <a:t>http://bit.ly/xyz</a:t>
-            </a:r>
-            <a:r>
-              <a:rPr lang="de-DE" sz="2400" dirty="0"/>
-              <a:t> (</a:t>
-            </a:r>
-            <a:r>
-              <a:rPr lang="de-DE" sz="2400" dirty="0" err="1"/>
-              <a:t>ToDo</a:t>
-            </a:r>
-            <a:r>
-              <a:rPr lang="de-DE" sz="2400" dirty="0"/>
-              <a:t>: </a:t>
-            </a:r>
-            <a:r>
-              <a:rPr lang="de-DE" sz="2400" dirty="0" err="1"/>
-              <a:t>Slideshare</a:t>
-            </a:r>
-            <a:r>
-              <a:rPr lang="de-DE" sz="2400" dirty="0"/>
-              <a:t>)</a:t>
+              <a:t>https://bit.ly/2DlC7AE</a:t>
             </a:r>
             <a:br>
               <a:rPr lang="de-DE" sz="2400" dirty="0"/>
             </a:br>
             <a:r>
               <a:rPr lang="de-DE" sz="2400" dirty="0"/>
-              <a:t>TriXX-Dokumentation: 	 https://</a:t>
-            </a:r>
-            <a:r>
-              <a:rPr lang="de-DE" sz="2400" dirty="0" err="1"/>
-              <a:t>main.git.osp-dd.de</a:t>
-            </a:r>
-            <a:r>
+              <a:t>							</a:t>
+            </a:r>
+            <a:br>
               <a:rPr lang="de-DE" sz="2400" dirty="0"/>
-              <a:t>/</a:t>
-            </a:r>
-            <a:r>
-              <a:rPr lang="de-DE" sz="2400" dirty="0" err="1"/>
-              <a:t>trixx</a:t>
-            </a:r>
+            </a:br>
             <a:r>
               <a:rPr lang="de-DE" sz="2400" dirty="0"/>
-              <a:t>/</a:t>
-            </a:r>
-            <a:r>
-              <a:rPr lang="de-DE" sz="2400" dirty="0" err="1"/>
-              <a:t>trixx.html</a:t>
-            </a:r>
+              <a:t>TriXX-Dokumentation: 	 	</a:t>
+            </a:r>
+            <a:r>
+              <a:rPr lang="de-DE" sz="2400" dirty="0">
+                <a:hlinkClick r:id="rId4"/>
+              </a:rPr>
+              <a:t>https://bit.ly/3jF1XPD</a:t>
+            </a:r>
+            <a:br>
+              <a:rPr lang="de-DE" sz="2400" dirty="0"/>
+            </a:br>
+            <a:br>
+              <a:rPr lang="de-DE" sz="2400" dirty="0"/>
+            </a:br>
             <a:br>
               <a:rPr lang="de-DE" sz="2400" dirty="0"/>
             </a:br>
@@ -18671,7 +18703,7 @@
                 <a:solidFill>
                   <a:srgbClr val="313231"/>
                 </a:solidFill>
-                <a:hlinkClick r:id="rId4"/>
+                <a:hlinkClick r:id="rId5"/>
               </a:rPr>
               <a:t>osp.de</a:t>
             </a:r>

</xml_diff>